<commit_message>
přepsání UI tabulky do vlastni
</commit_message>
<xml_diff>
--- a/prezentace/obhajoba.pptx
+++ b/prezentace/obhajoba.pptx
@@ -14885,43 +14885,6 @@
       </p:sp>
       <p:sp>
         <p:nvSpPr>
-          <p:cNvPr id="3" name="Zástupný text 2">
-            <a:extLst>
-              <a:ext uri="{FF2B5EF4-FFF2-40B4-BE49-F238E27FC236}">
-                <a16:creationId xmlns:a16="http://schemas.microsoft.com/office/drawing/2014/main" id="{7F11784E-AC65-AAC7-3A0A-A60E6EF0863A}"/>
-              </a:ext>
-            </a:extLst>
-          </p:cNvPr>
-          <p:cNvSpPr>
-            <a:spLocks noGrp="1"/>
-          </p:cNvSpPr>
-          <p:nvPr>
-            <p:ph type="body" idx="1"/>
-          </p:nvPr>
-        </p:nvSpPr>
-        <p:spPr/>
-        <p:txBody>
-          <a:bodyPr/>
-          <a:lstStyle/>
-          <a:p>
-            <a:r>
-              <a:rPr lang="cs-CZ" dirty="0"/>
-              <a:t>Děkuji za pozornost</a:t>
-            </a:r>
-          </a:p>
-          <a:p>
-            <a:endParaRPr lang="cs-CZ" dirty="0"/>
-          </a:p>
-          <a:p>
-            <a:pPr marL="114300" indent="0">
-              <a:buNone/>
-            </a:pPr>
-            <a:endParaRPr lang="cs-CZ" dirty="0"/>
-          </a:p>
-        </p:txBody>
-      </p:sp>
-      <p:sp>
-        <p:nvSpPr>
           <p:cNvPr id="4" name="Zástupný symbol pro číslo snímku 3">
             <a:extLst>
               <a:ext uri="{FF2B5EF4-FFF2-40B4-BE49-F238E27FC236}">
@@ -14947,6 +14910,41 @@
               <a:t>11</a:t>
             </a:fld>
             <a:endParaRPr lang="cs-CZ"/>
+          </a:p>
+        </p:txBody>
+      </p:sp>
+      <p:sp>
+        <p:nvSpPr>
+          <p:cNvPr id="7" name="TextovéPole 6">
+            <a:extLst>
+              <a:ext uri="{FF2B5EF4-FFF2-40B4-BE49-F238E27FC236}">
+                <a16:creationId xmlns:a16="http://schemas.microsoft.com/office/drawing/2014/main" id="{E5E7A004-20AF-C1BD-3FF5-5FF0CF84F263}"/>
+              </a:ext>
+            </a:extLst>
+          </p:cNvPr>
+          <p:cNvSpPr txBox="1"/>
+          <p:nvPr/>
+        </p:nvSpPr>
+        <p:spPr>
+          <a:xfrm>
+            <a:off x="3386667" y="3184157"/>
+            <a:ext cx="5596404" cy="830997"/>
+          </a:xfrm>
+          <a:prstGeom prst="rect">
+            <a:avLst/>
+          </a:prstGeom>
+          <a:noFill/>
+        </p:spPr>
+        <p:txBody>
+          <a:bodyPr wrap="none" rtlCol="0">
+            <a:spAutoFit/>
+          </a:bodyPr>
+          <a:lstStyle/>
+          <a:p>
+            <a:r>
+              <a:rPr lang="cs-CZ" sz="4800" dirty="0"/>
+              <a:t>Děkuji za pozornost</a:t>
+            </a:r>
           </a:p>
         </p:txBody>
       </p:sp>
@@ -15568,11 +15566,11 @@
           <a:p>
             <a:r>
               <a:rPr lang="cs-CZ" dirty="0"/>
-              <a:t>porovnání uživatelská rozhraní a herní </a:t>
+              <a:t>porovnání uživatelských rozhraní pro .NET a herních </a:t>
             </a:r>
             <a:r>
               <a:rPr lang="cs-CZ" dirty="0" err="1"/>
-              <a:t>enginy</a:t>
+              <a:t>enginů</a:t>
             </a:r>
             <a:endParaRPr lang="cs-CZ" dirty="0"/>
           </a:p>
@@ -15673,7 +15671,7 @@
           <a:p>
             <a:r>
               <a:rPr lang="cs-CZ" dirty="0"/>
-              <a:t>Výběr programovacího jazyku</a:t>
+              <a:t>Komparace uvažovaných programovacích jazyků</a:t>
             </a:r>
           </a:p>
         </p:txBody>
@@ -17573,7 +17571,7 @@
           <a:p>
             <a:r>
               <a:rPr lang="cs-CZ" dirty="0"/>
-              <a:t>Představení typů uživatelských rozhraní</a:t>
+              <a:t>porovnání uživatelských rozhraní</a:t>
             </a:r>
           </a:p>
         </p:txBody>
@@ -17608,36 +17606,470 @@
           </a:p>
         </p:txBody>
       </p:sp>
-      <p:pic>
-        <p:nvPicPr>
-          <p:cNvPr id="5" name="Obrázek 4">
+      <p:graphicFrame>
+        <p:nvGraphicFramePr>
+          <p:cNvPr id="3" name="Tabulka 5">
             <a:extLst>
               <a:ext uri="{FF2B5EF4-FFF2-40B4-BE49-F238E27FC236}">
-                <a16:creationId xmlns:a16="http://schemas.microsoft.com/office/drawing/2014/main" id="{18C340BB-B2A1-1D13-12C3-D4E3B5B1B06B}"/>
+                <a16:creationId xmlns:a16="http://schemas.microsoft.com/office/drawing/2014/main" id="{0155AB96-F904-BAA3-A871-F2B690534B24}"/>
               </a:ext>
             </a:extLst>
           </p:cNvPr>
-          <p:cNvPicPr>
-            <a:picLocks noChangeAspect="1"/>
-          </p:cNvPicPr>
-          <p:nvPr/>
-        </p:nvPicPr>
-        <p:blipFill>
-          <a:blip r:embed="rId2"/>
-          <a:stretch>
-            <a:fillRect/>
-          </a:stretch>
-        </p:blipFill>
-        <p:spPr>
-          <a:xfrm>
-            <a:off x="1685925" y="1049901"/>
-            <a:ext cx="9855816" cy="5672532"/>
-          </a:xfrm>
-          <a:prstGeom prst="rect">
-            <a:avLst/>
-          </a:prstGeom>
-        </p:spPr>
-      </p:pic>
+          <p:cNvGraphicFramePr>
+            <a:graphicFrameLocks noGrp="1"/>
+          </p:cNvGraphicFramePr>
+          <p:nvPr>
+            <p:extLst>
+              <p:ext uri="{D42A27DB-BD31-4B8C-83A1-F6EECF244321}">
+                <p14:modId xmlns:p14="http://schemas.microsoft.com/office/powerpoint/2010/main" val="3977257634"/>
+              </p:ext>
+            </p:extLst>
+          </p:nvPr>
+        </p:nvGraphicFramePr>
+        <p:xfrm>
+          <a:off x="327378" y="1556367"/>
+          <a:ext cx="11604979" cy="3951482"/>
+        </p:xfrm>
+        <a:graphic>
+          <a:graphicData uri="http://schemas.openxmlformats.org/drawingml/2006/table">
+            <a:tbl>
+              <a:tblPr firstRow="1" bandRow="1">
+                <a:tableStyleId>{5940675A-B579-460E-94D1-54222C63F5DA}</a:tableStyleId>
+              </a:tblPr>
+              <a:tblGrid>
+                <a:gridCol w="1580444">
+                  <a:extLst>
+                    <a:ext uri="{9D8B030D-6E8A-4147-A177-3AD203B41FA5}">
+                      <a16:colId xmlns:a16="http://schemas.microsoft.com/office/drawing/2014/main" val="118925391"/>
+                    </a:ext>
+                  </a:extLst>
+                </a:gridCol>
+                <a:gridCol w="3872089">
+                  <a:extLst>
+                    <a:ext uri="{9D8B030D-6E8A-4147-A177-3AD203B41FA5}">
+                      <a16:colId xmlns:a16="http://schemas.microsoft.com/office/drawing/2014/main" val="1808954872"/>
+                    </a:ext>
+                  </a:extLst>
+                </a:gridCol>
+                <a:gridCol w="3251201">
+                  <a:extLst>
+                    <a:ext uri="{9D8B030D-6E8A-4147-A177-3AD203B41FA5}">
+                      <a16:colId xmlns:a16="http://schemas.microsoft.com/office/drawing/2014/main" val="162510989"/>
+                    </a:ext>
+                  </a:extLst>
+                </a:gridCol>
+                <a:gridCol w="2901245">
+                  <a:extLst>
+                    <a:ext uri="{9D8B030D-6E8A-4147-A177-3AD203B41FA5}">
+                      <a16:colId xmlns:a16="http://schemas.microsoft.com/office/drawing/2014/main" val="3809194893"/>
+                    </a:ext>
+                  </a:extLst>
+                </a:gridCol>
+              </a:tblGrid>
+              <a:tr h="385322">
+                <a:tc>
+                  <a:txBody>
+                    <a:bodyPr/>
+                    <a:lstStyle/>
+                    <a:p>
+                      <a:endParaRPr lang="cs-CZ"/>
+                    </a:p>
+                  </a:txBody>
+                  <a:tcPr/>
+                </a:tc>
+                <a:tc>
+                  <a:txBody>
+                    <a:bodyPr/>
+                    <a:lstStyle/>
+                    <a:p>
+                      <a:r>
+                        <a:rPr lang="cs-CZ" b="1" dirty="0"/>
+                        <a:t>použití</a:t>
+                      </a:r>
+                    </a:p>
+                  </a:txBody>
+                  <a:tcPr/>
+                </a:tc>
+                <a:tc>
+                  <a:txBody>
+                    <a:bodyPr/>
+                    <a:lstStyle/>
+                    <a:p>
+                      <a:r>
+                        <a:rPr lang="cs-CZ" b="1" dirty="0"/>
+                        <a:t>výhody</a:t>
+                      </a:r>
+                    </a:p>
+                  </a:txBody>
+                  <a:tcPr/>
+                </a:tc>
+                <a:tc>
+                  <a:txBody>
+                    <a:bodyPr/>
+                    <a:lstStyle/>
+                    <a:p>
+                      <a:r>
+                        <a:rPr lang="cs-CZ" b="1" dirty="0"/>
+                        <a:t>nevýhody</a:t>
+                      </a:r>
+                    </a:p>
+                  </a:txBody>
+                  <a:tcPr/>
+                </a:tc>
+                <a:extLst>
+                  <a:ext uri="{0D108BD9-81ED-4DB2-BD59-A6C34878D82A}">
+                    <a16:rowId xmlns:a16="http://schemas.microsoft.com/office/drawing/2014/main" val="4036211627"/>
+                  </a:ext>
+                </a:extLst>
+              </a:tr>
+              <a:tr h="370840">
+                <a:tc>
+                  <a:txBody>
+                    <a:bodyPr/>
+                    <a:lstStyle/>
+                    <a:p>
+                      <a:r>
+                        <a:rPr lang="cs-CZ" b="1" dirty="0"/>
+                        <a:t>Konzole</a:t>
+                      </a:r>
+                    </a:p>
+                  </a:txBody>
+                  <a:tcPr/>
+                </a:tc>
+                <a:tc>
+                  <a:txBody>
+                    <a:bodyPr/>
+                    <a:lstStyle/>
+                    <a:p>
+                      <a:r>
+                        <a:rPr lang="cs-CZ" dirty="0"/>
+                        <a:t>automatizace</a:t>
+                      </a:r>
+                    </a:p>
+                  </a:txBody>
+                  <a:tcPr/>
+                </a:tc>
+                <a:tc>
+                  <a:txBody>
+                    <a:bodyPr/>
+                    <a:lstStyle/>
+                    <a:p>
+                      <a:r>
+                        <a:rPr lang="cs-CZ" dirty="0"/>
+                        <a:t>Rychlé a jednoduché</a:t>
+                      </a:r>
+                    </a:p>
+                    <a:p>
+                      <a:r>
+                        <a:rPr lang="cs-CZ" dirty="0"/>
+                        <a:t>Stabilní</a:t>
+                      </a:r>
+                    </a:p>
+                    <a:p>
+                      <a:r>
+                        <a:rPr lang="cs-CZ" dirty="0"/>
+                        <a:t>Vhodné pro testování</a:t>
+                      </a:r>
+                    </a:p>
+                    <a:p>
+                      <a:r>
+                        <a:rPr lang="cs-CZ" dirty="0" err="1"/>
+                        <a:t>Cross-platform</a:t>
+                      </a:r>
+                      <a:endParaRPr lang="cs-CZ" dirty="0"/>
+                    </a:p>
+                  </a:txBody>
+                  <a:tcPr/>
+                </a:tc>
+                <a:tc>
+                  <a:txBody>
+                    <a:bodyPr/>
+                    <a:lstStyle/>
+                    <a:p>
+                      <a:r>
+                        <a:rPr lang="cs-CZ" dirty="0"/>
+                        <a:t>Nevhodné pro běžného uživatele</a:t>
+                      </a:r>
+                    </a:p>
+                  </a:txBody>
+                  <a:tcPr/>
+                </a:tc>
+                <a:extLst>
+                  <a:ext uri="{0D108BD9-81ED-4DB2-BD59-A6C34878D82A}">
+                    <a16:rowId xmlns:a16="http://schemas.microsoft.com/office/drawing/2014/main" val="274455474"/>
+                  </a:ext>
+                </a:extLst>
+              </a:tr>
+              <a:tr h="370840">
+                <a:tc>
+                  <a:txBody>
+                    <a:bodyPr/>
+                    <a:lstStyle/>
+                    <a:p>
+                      <a:r>
+                        <a:rPr lang="cs-CZ" b="1" dirty="0"/>
+                        <a:t>WinForm</a:t>
+                      </a:r>
+                    </a:p>
+                  </a:txBody>
+                  <a:tcPr/>
+                </a:tc>
+                <a:tc>
+                  <a:txBody>
+                    <a:bodyPr/>
+                    <a:lstStyle/>
+                    <a:p>
+                      <a:r>
+                        <a:rPr lang="cs-CZ" dirty="0"/>
+                        <a:t>Jednoduché UI</a:t>
+                      </a:r>
+                    </a:p>
+                    <a:p>
+                      <a:r>
+                        <a:rPr lang="cs-CZ" dirty="0"/>
+                        <a:t>Rychlý vývoj</a:t>
+                      </a:r>
+                    </a:p>
+                  </a:txBody>
+                  <a:tcPr/>
+                </a:tc>
+                <a:tc>
+                  <a:txBody>
+                    <a:bodyPr/>
+                    <a:lstStyle/>
+                    <a:p>
+                      <a:r>
+                        <a:rPr lang="cs-CZ" dirty="0"/>
+                        <a:t>Rychlé a jednoduché</a:t>
+                      </a:r>
+                    </a:p>
+                    <a:p>
+                      <a:r>
+                        <a:rPr lang="cs-CZ" dirty="0"/>
+                        <a:t>Hodně používané</a:t>
+                      </a:r>
+                    </a:p>
+                    <a:p>
+                      <a:r>
+                        <a:rPr lang="cs-CZ" dirty="0"/>
+                        <a:t>Spolehlivé</a:t>
+                      </a:r>
+                    </a:p>
+                    <a:p>
+                      <a:r>
+                        <a:rPr lang="cs-CZ" dirty="0"/>
+                        <a:t>Použitelné při vzdálené ploše</a:t>
+                      </a:r>
+                    </a:p>
+                  </a:txBody>
+                  <a:tcPr/>
+                </a:tc>
+                <a:tc>
+                  <a:txBody>
+                    <a:bodyPr/>
+                    <a:lstStyle/>
+                    <a:p>
+                      <a:r>
+                        <a:rPr lang="cs-CZ" dirty="0"/>
+                        <a:t>Veškerou práci dělá CPU</a:t>
+                      </a:r>
+                    </a:p>
+                    <a:p>
+                      <a:r>
+                        <a:rPr lang="cs-CZ" dirty="0"/>
+                        <a:t>Obtížná změna velikosti</a:t>
+                      </a:r>
+                    </a:p>
+                  </a:txBody>
+                  <a:tcPr/>
+                </a:tc>
+                <a:extLst>
+                  <a:ext uri="{0D108BD9-81ED-4DB2-BD59-A6C34878D82A}">
+                    <a16:rowId xmlns:a16="http://schemas.microsoft.com/office/drawing/2014/main" val="3953841490"/>
+                  </a:ext>
+                </a:extLst>
+              </a:tr>
+              <a:tr h="370840">
+                <a:tc>
+                  <a:txBody>
+                    <a:bodyPr/>
+                    <a:lstStyle/>
+                    <a:p>
+                      <a:r>
+                        <a:rPr lang="cs-CZ" b="1" dirty="0"/>
+                        <a:t>WPF</a:t>
+                      </a:r>
+                    </a:p>
+                  </a:txBody>
+                  <a:tcPr/>
+                </a:tc>
+                <a:tc>
+                  <a:txBody>
+                    <a:bodyPr/>
+                    <a:lstStyle/>
+                    <a:p>
+                      <a:r>
+                        <a:rPr lang="cs-CZ" dirty="0"/>
+                        <a:t>Výkonné UI</a:t>
+                      </a:r>
+                    </a:p>
+                  </a:txBody>
+                  <a:tcPr/>
+                </a:tc>
+                <a:tc>
+                  <a:txBody>
+                    <a:bodyPr/>
+                    <a:lstStyle/>
+                    <a:p>
+                      <a:r>
+                        <a:rPr lang="cs-CZ" dirty="0"/>
+                        <a:t>DirectX</a:t>
+                      </a:r>
+                    </a:p>
+                    <a:p>
+                      <a:r>
+                        <a:rPr lang="cs-CZ" dirty="0"/>
+                        <a:t>Moderní design</a:t>
+                      </a:r>
+                    </a:p>
+                    <a:p>
+                      <a:r>
+                        <a:rPr lang="cs-CZ" dirty="0"/>
+                        <a:t>MVVM </a:t>
+                      </a:r>
+                      <a:r>
+                        <a:rPr lang="cs-CZ" dirty="0" err="1"/>
+                        <a:t>pattern</a:t>
+                      </a:r>
+                      <a:endParaRPr lang="cs-CZ" dirty="0"/>
+                    </a:p>
+                    <a:p>
+                      <a:r>
+                        <a:rPr lang="cs-CZ" dirty="0"/>
+                        <a:t>Designer nemusí umět programovat</a:t>
+                      </a:r>
+                    </a:p>
+                  </a:txBody>
+                  <a:tcPr/>
+                </a:tc>
+                <a:tc>
+                  <a:txBody>
+                    <a:bodyPr/>
+                    <a:lstStyle/>
+                    <a:p>
+                      <a:r>
+                        <a:rPr lang="cs-CZ" dirty="0"/>
+                        <a:t>Pomalý vývoj</a:t>
+                      </a:r>
+                    </a:p>
+                    <a:p>
+                      <a:r>
+                        <a:rPr lang="cs-CZ" dirty="0"/>
+                        <a:t>XAML</a:t>
+                      </a:r>
+                    </a:p>
+                  </a:txBody>
+                  <a:tcPr/>
+                </a:tc>
+                <a:extLst>
+                  <a:ext uri="{0D108BD9-81ED-4DB2-BD59-A6C34878D82A}">
+                    <a16:rowId xmlns:a16="http://schemas.microsoft.com/office/drawing/2014/main" val="1882315354"/>
+                  </a:ext>
+                </a:extLst>
+              </a:tr>
+              <a:tr h="370840">
+                <a:tc>
+                  <a:txBody>
+                    <a:bodyPr/>
+                    <a:lstStyle/>
+                    <a:p>
+                      <a:r>
+                        <a:rPr lang="cs-CZ" b="1" dirty="0" err="1"/>
+                        <a:t>Xamarin</a:t>
+                      </a:r>
+                      <a:r>
+                        <a:rPr lang="cs-CZ" b="1" dirty="0"/>
+                        <a:t>/MAUI</a:t>
+                      </a:r>
+                    </a:p>
+                  </a:txBody>
+                  <a:tcPr/>
+                </a:tc>
+                <a:tc>
+                  <a:txBody>
+                    <a:bodyPr/>
+                    <a:lstStyle/>
+                    <a:p>
+                      <a:r>
+                        <a:rPr lang="cs-CZ" dirty="0"/>
+                        <a:t>Aplikace pro Windows10/11 a Xbox</a:t>
+                      </a:r>
+                    </a:p>
+                    <a:p>
+                      <a:r>
+                        <a:rPr lang="cs-CZ" dirty="0"/>
+                        <a:t>Mobilní aplikace</a:t>
+                      </a:r>
+                    </a:p>
+                  </a:txBody>
+                  <a:tcPr/>
+                </a:tc>
+                <a:tc>
+                  <a:txBody>
+                    <a:bodyPr/>
+                    <a:lstStyle/>
+                    <a:p>
+                      <a:r>
+                        <a:rPr lang="cs-CZ" dirty="0" err="1"/>
+                        <a:t>Sandbox</a:t>
+                      </a:r>
+                      <a:endParaRPr lang="cs-CZ" dirty="0"/>
+                    </a:p>
+                    <a:p>
+                      <a:r>
+                        <a:rPr lang="cs-CZ" dirty="0"/>
+                        <a:t>Distribuce přes obchod</a:t>
+                      </a:r>
+                    </a:p>
+                  </a:txBody>
+                  <a:tcPr/>
+                </a:tc>
+                <a:tc>
+                  <a:txBody>
+                    <a:bodyPr/>
+                    <a:lstStyle/>
+                    <a:p>
+                      <a:r>
+                        <a:rPr lang="cs-CZ" dirty="0" err="1"/>
+                        <a:t>Sandbox</a:t>
+                      </a:r>
+                      <a:endParaRPr lang="cs-CZ" dirty="0"/>
+                    </a:p>
+                    <a:p>
+                      <a:r>
+                        <a:rPr lang="cs-CZ" dirty="0"/>
+                        <a:t>Nefunguje pro starší Windows</a:t>
+                      </a:r>
+                    </a:p>
+                    <a:p>
+                      <a:r>
+                        <a:rPr lang="cs-CZ" dirty="0"/>
+                        <a:t>Obtížná distribuce</a:t>
+                      </a:r>
+                    </a:p>
+                  </a:txBody>
+                  <a:tcPr/>
+                </a:tc>
+                <a:extLst>
+                  <a:ext uri="{0D108BD9-81ED-4DB2-BD59-A6C34878D82A}">
+                    <a16:rowId xmlns:a16="http://schemas.microsoft.com/office/drawing/2014/main" val="2889852098"/>
+                  </a:ext>
+                </a:extLst>
+              </a:tr>
+            </a:tbl>
+          </a:graphicData>
+        </a:graphic>
+      </p:graphicFrame>
     </p:spTree>
     <p:extLst>
       <p:ext uri="{BB962C8B-B14F-4D97-AF65-F5344CB8AC3E}">
@@ -17691,7 +18123,7 @@
           <a:p>
             <a:r>
               <a:rPr lang="cs-CZ" dirty="0"/>
-              <a:t>Představení tří nejpoužívanějších herních </a:t>
+              <a:t>porovnání herních </a:t>
             </a:r>
             <a:r>
               <a:rPr lang="cs-CZ" dirty="0" err="1"/>

</xml_diff>